<commit_message>
plugin: initial gRPC API
Signed-off-by: Akihiro Suda <suda.akihiro@lab.ntt.co.jp>
</commit_message>
<xml_diff>
--- a/docs/images.pptx
+++ b/docs/images.pptx
@@ -107,6 +107,11 @@
       </a:defRPr>
     </a:lvl9pPr>
   </p:defaultTextStyle>
+  <p:extLst>
+    <p:ext uri="{EFAFB233-063F-42B5-8137-9DF3F51BA10A}">
+      <p15:sldGuideLst xmlns:p15="http://schemas.microsoft.com/office/powerpoint/2012/main"/>
+    </p:ext>
+  </p:extLst>
 </p:presentation>
 </file>
 
@@ -192,7 +197,7 @@
           <a:p>
             <a:fld id="{56E6FCB7-F47E-4B89-8B23-BD68BD81318A}" type="datetimeFigureOut">
               <a:rPr kumimoji="1" lang="ja-JP" altLang="en-US" smtClean="0"/>
-              <a:t>2018/3/27</a:t>
+              <a:t>2018/3/29</a:t>
             </a:fld>
             <a:endParaRPr kumimoji="1" lang="ja-JP" altLang="en-US"/>
           </a:p>
@@ -256,70 +261,69 @@
           <a:p>
             <a:pPr lvl="0"/>
             <a:r>
-              <a:rPr kumimoji="1" lang="ja-JP" altLang="en-US" smtClean="0"/>
+              <a:rPr kumimoji="1" lang="ja-JP" altLang="en-US"/>
               <a:t>マスター テキストの書式設定</a:t>
             </a:r>
           </a:p>
           <a:p>
             <a:pPr lvl="1"/>
             <a:r>
-              <a:rPr kumimoji="1" lang="ja-JP" altLang="en-US" smtClean="0"/>
+              <a:rPr kumimoji="1" lang="ja-JP" altLang="en-US"/>
               <a:t>第 </a:t>
             </a:r>
             <a:r>
-              <a:rPr kumimoji="1" lang="en-US" altLang="ja-JP" smtClean="0"/>
+              <a:rPr kumimoji="1" lang="en-US" altLang="ja-JP"/>
               <a:t>2 </a:t>
             </a:r>
             <a:r>
-              <a:rPr kumimoji="1" lang="ja-JP" altLang="en-US" smtClean="0"/>
+              <a:rPr kumimoji="1" lang="ja-JP" altLang="en-US"/>
               <a:t>レベル</a:t>
             </a:r>
           </a:p>
           <a:p>
             <a:pPr lvl="2"/>
             <a:r>
-              <a:rPr kumimoji="1" lang="ja-JP" altLang="en-US" smtClean="0"/>
+              <a:rPr kumimoji="1" lang="ja-JP" altLang="en-US"/>
               <a:t>第 </a:t>
             </a:r>
             <a:r>
-              <a:rPr kumimoji="1" lang="en-US" altLang="ja-JP" smtClean="0"/>
+              <a:rPr kumimoji="1" lang="en-US" altLang="ja-JP"/>
               <a:t>3 </a:t>
             </a:r>
             <a:r>
-              <a:rPr kumimoji="1" lang="ja-JP" altLang="en-US" smtClean="0"/>
+              <a:rPr kumimoji="1" lang="ja-JP" altLang="en-US"/>
               <a:t>レベル</a:t>
             </a:r>
           </a:p>
           <a:p>
             <a:pPr lvl="3"/>
             <a:r>
-              <a:rPr kumimoji="1" lang="ja-JP" altLang="en-US" smtClean="0"/>
+              <a:rPr kumimoji="1" lang="ja-JP" altLang="en-US"/>
               <a:t>第 </a:t>
             </a:r>
             <a:r>
-              <a:rPr kumimoji="1" lang="en-US" altLang="ja-JP" smtClean="0"/>
+              <a:rPr kumimoji="1" lang="en-US" altLang="ja-JP"/>
               <a:t>4 </a:t>
             </a:r>
             <a:r>
-              <a:rPr kumimoji="1" lang="ja-JP" altLang="en-US" smtClean="0"/>
+              <a:rPr kumimoji="1" lang="ja-JP" altLang="en-US"/>
               <a:t>レベル</a:t>
             </a:r>
           </a:p>
           <a:p>
             <a:pPr lvl="4"/>
             <a:r>
-              <a:rPr kumimoji="1" lang="ja-JP" altLang="en-US" smtClean="0"/>
+              <a:rPr kumimoji="1" lang="ja-JP" altLang="en-US"/>
               <a:t>第 </a:t>
             </a:r>
             <a:r>
-              <a:rPr kumimoji="1" lang="en-US" altLang="ja-JP" smtClean="0"/>
+              <a:rPr kumimoji="1" lang="en-US" altLang="ja-JP"/>
               <a:t>5 </a:t>
             </a:r>
             <a:r>
-              <a:rPr kumimoji="1" lang="ja-JP" altLang="en-US" smtClean="0"/>
+              <a:rPr kumimoji="1" lang="ja-JP" altLang="en-US"/>
               <a:t>レベル</a:t>
             </a:r>
-            <a:endParaRPr kumimoji="1" lang="ja-JP" altLang="en-US"/>
           </a:p>
         </p:txBody>
       </p:sp>
@@ -536,6 +540,10 @@
           <a:bodyPr/>
           <a:lstStyle/>
           <a:p>
+            <a:r>
+              <a:rPr kumimoji="1" lang="en-US" altLang="ja-JP" dirty="0" err="1"/>
+              <a:t>cbi.png</a:t>
+            </a:r>
             <a:endParaRPr kumimoji="1" lang="ja-JP" altLang="en-US" dirty="0"/>
           </a:p>
         </p:txBody>
@@ -618,10 +626,9 @@
           </a:lstStyle>
           <a:p>
             <a:r>
-              <a:rPr kumimoji="1" lang="ja-JP" altLang="en-US" smtClean="0"/>
+              <a:rPr kumimoji="1" lang="ja-JP" altLang="en-US"/>
               <a:t>マスター タイトルの書式設定</a:t>
             </a:r>
-            <a:endParaRPr kumimoji="1" lang="ja-JP" altLang="en-US"/>
           </a:p>
         </p:txBody>
       </p:sp>
@@ -683,10 +690,9 @@
           </a:lstStyle>
           <a:p>
             <a:r>
-              <a:rPr kumimoji="1" lang="ja-JP" altLang="en-US" smtClean="0"/>
+              <a:rPr kumimoji="1" lang="ja-JP" altLang="en-US"/>
               <a:t>マスター サブタイトルの書式設定</a:t>
             </a:r>
-            <a:endParaRPr kumimoji="1" lang="ja-JP" altLang="en-US"/>
           </a:p>
         </p:txBody>
       </p:sp>
@@ -707,7 +713,7 @@
           <a:p>
             <a:fld id="{A7B7A78B-F83C-433A-B1D8-7A578860BA1C}" type="datetimeFigureOut">
               <a:rPr kumimoji="1" lang="ja-JP" altLang="en-US" smtClean="0"/>
-              <a:t>2018/3/27</a:t>
+              <a:t>2018/3/29</a:t>
             </a:fld>
             <a:endParaRPr kumimoji="1" lang="ja-JP" altLang="en-US"/>
           </a:p>
@@ -801,10 +807,9 @@
           <a:lstStyle/>
           <a:p>
             <a:r>
-              <a:rPr kumimoji="1" lang="ja-JP" altLang="en-US" smtClean="0"/>
+              <a:rPr kumimoji="1" lang="ja-JP" altLang="en-US"/>
               <a:t>マスター タイトルの書式設定</a:t>
             </a:r>
-            <a:endParaRPr kumimoji="1" lang="ja-JP" altLang="en-US"/>
           </a:p>
         </p:txBody>
       </p:sp>
@@ -825,70 +830,69 @@
           <a:p>
             <a:pPr lvl="0"/>
             <a:r>
-              <a:rPr kumimoji="1" lang="ja-JP" altLang="en-US" smtClean="0"/>
+              <a:rPr kumimoji="1" lang="ja-JP" altLang="en-US"/>
               <a:t>マスター テキストの書式設定</a:t>
             </a:r>
           </a:p>
           <a:p>
             <a:pPr lvl="1"/>
             <a:r>
-              <a:rPr kumimoji="1" lang="ja-JP" altLang="en-US" smtClean="0"/>
+              <a:rPr kumimoji="1" lang="ja-JP" altLang="en-US"/>
               <a:t>第 </a:t>
             </a:r>
             <a:r>
-              <a:rPr kumimoji="1" lang="en-US" altLang="ja-JP" smtClean="0"/>
+              <a:rPr kumimoji="1" lang="en-US" altLang="ja-JP"/>
               <a:t>2 </a:t>
             </a:r>
             <a:r>
-              <a:rPr kumimoji="1" lang="ja-JP" altLang="en-US" smtClean="0"/>
+              <a:rPr kumimoji="1" lang="ja-JP" altLang="en-US"/>
               <a:t>レベル</a:t>
             </a:r>
           </a:p>
           <a:p>
             <a:pPr lvl="2"/>
             <a:r>
-              <a:rPr kumimoji="1" lang="ja-JP" altLang="en-US" smtClean="0"/>
+              <a:rPr kumimoji="1" lang="ja-JP" altLang="en-US"/>
               <a:t>第 </a:t>
             </a:r>
             <a:r>
-              <a:rPr kumimoji="1" lang="en-US" altLang="ja-JP" smtClean="0"/>
+              <a:rPr kumimoji="1" lang="en-US" altLang="ja-JP"/>
               <a:t>3 </a:t>
             </a:r>
             <a:r>
-              <a:rPr kumimoji="1" lang="ja-JP" altLang="en-US" smtClean="0"/>
+              <a:rPr kumimoji="1" lang="ja-JP" altLang="en-US"/>
               <a:t>レベル</a:t>
             </a:r>
           </a:p>
           <a:p>
             <a:pPr lvl="3"/>
             <a:r>
-              <a:rPr kumimoji="1" lang="ja-JP" altLang="en-US" smtClean="0"/>
+              <a:rPr kumimoji="1" lang="ja-JP" altLang="en-US"/>
               <a:t>第 </a:t>
             </a:r>
             <a:r>
-              <a:rPr kumimoji="1" lang="en-US" altLang="ja-JP" smtClean="0"/>
+              <a:rPr kumimoji="1" lang="en-US" altLang="ja-JP"/>
               <a:t>4 </a:t>
             </a:r>
             <a:r>
-              <a:rPr kumimoji="1" lang="ja-JP" altLang="en-US" smtClean="0"/>
+              <a:rPr kumimoji="1" lang="ja-JP" altLang="en-US"/>
               <a:t>レベル</a:t>
             </a:r>
           </a:p>
           <a:p>
             <a:pPr lvl="4"/>
             <a:r>
-              <a:rPr kumimoji="1" lang="ja-JP" altLang="en-US" smtClean="0"/>
+              <a:rPr kumimoji="1" lang="ja-JP" altLang="en-US"/>
               <a:t>第 </a:t>
             </a:r>
             <a:r>
-              <a:rPr kumimoji="1" lang="en-US" altLang="ja-JP" smtClean="0"/>
+              <a:rPr kumimoji="1" lang="en-US" altLang="ja-JP"/>
               <a:t>5 </a:t>
             </a:r>
             <a:r>
-              <a:rPr kumimoji="1" lang="ja-JP" altLang="en-US" smtClean="0"/>
+              <a:rPr kumimoji="1" lang="ja-JP" altLang="en-US"/>
               <a:t>レベル</a:t>
             </a:r>
-            <a:endParaRPr kumimoji="1" lang="ja-JP" altLang="en-US"/>
           </a:p>
         </p:txBody>
       </p:sp>
@@ -909,7 +913,7 @@
           <a:p>
             <a:fld id="{A7B7A78B-F83C-433A-B1D8-7A578860BA1C}" type="datetimeFigureOut">
               <a:rPr kumimoji="1" lang="ja-JP" altLang="en-US" smtClean="0"/>
-              <a:t>2018/3/27</a:t>
+              <a:t>2018/3/29</a:t>
             </a:fld>
             <a:endParaRPr kumimoji="1" lang="ja-JP" altLang="en-US"/>
           </a:p>
@@ -1008,10 +1012,9 @@
           <a:lstStyle/>
           <a:p>
             <a:r>
-              <a:rPr kumimoji="1" lang="ja-JP" altLang="en-US" smtClean="0"/>
+              <a:rPr kumimoji="1" lang="ja-JP" altLang="en-US"/>
               <a:t>マスター タイトルの書式設定</a:t>
             </a:r>
-            <a:endParaRPr kumimoji="1" lang="ja-JP" altLang="en-US"/>
           </a:p>
         </p:txBody>
       </p:sp>
@@ -1037,70 +1040,69 @@
           <a:p>
             <a:pPr lvl="0"/>
             <a:r>
-              <a:rPr kumimoji="1" lang="ja-JP" altLang="en-US" smtClean="0"/>
+              <a:rPr kumimoji="1" lang="ja-JP" altLang="en-US"/>
               <a:t>マスター テキストの書式設定</a:t>
             </a:r>
           </a:p>
           <a:p>
             <a:pPr lvl="1"/>
             <a:r>
-              <a:rPr kumimoji="1" lang="ja-JP" altLang="en-US" smtClean="0"/>
+              <a:rPr kumimoji="1" lang="ja-JP" altLang="en-US"/>
               <a:t>第 </a:t>
             </a:r>
             <a:r>
-              <a:rPr kumimoji="1" lang="en-US" altLang="ja-JP" smtClean="0"/>
+              <a:rPr kumimoji="1" lang="en-US" altLang="ja-JP"/>
               <a:t>2 </a:t>
             </a:r>
             <a:r>
-              <a:rPr kumimoji="1" lang="ja-JP" altLang="en-US" smtClean="0"/>
+              <a:rPr kumimoji="1" lang="ja-JP" altLang="en-US"/>
               <a:t>レベル</a:t>
             </a:r>
           </a:p>
           <a:p>
             <a:pPr lvl="2"/>
             <a:r>
-              <a:rPr kumimoji="1" lang="ja-JP" altLang="en-US" smtClean="0"/>
+              <a:rPr kumimoji="1" lang="ja-JP" altLang="en-US"/>
               <a:t>第 </a:t>
             </a:r>
             <a:r>
-              <a:rPr kumimoji="1" lang="en-US" altLang="ja-JP" smtClean="0"/>
+              <a:rPr kumimoji="1" lang="en-US" altLang="ja-JP"/>
               <a:t>3 </a:t>
             </a:r>
             <a:r>
-              <a:rPr kumimoji="1" lang="ja-JP" altLang="en-US" smtClean="0"/>
+              <a:rPr kumimoji="1" lang="ja-JP" altLang="en-US"/>
               <a:t>レベル</a:t>
             </a:r>
           </a:p>
           <a:p>
             <a:pPr lvl="3"/>
             <a:r>
-              <a:rPr kumimoji="1" lang="ja-JP" altLang="en-US" smtClean="0"/>
+              <a:rPr kumimoji="1" lang="ja-JP" altLang="en-US"/>
               <a:t>第 </a:t>
             </a:r>
             <a:r>
-              <a:rPr kumimoji="1" lang="en-US" altLang="ja-JP" smtClean="0"/>
+              <a:rPr kumimoji="1" lang="en-US" altLang="ja-JP"/>
               <a:t>4 </a:t>
             </a:r>
             <a:r>
-              <a:rPr kumimoji="1" lang="ja-JP" altLang="en-US" smtClean="0"/>
+              <a:rPr kumimoji="1" lang="ja-JP" altLang="en-US"/>
               <a:t>レベル</a:t>
             </a:r>
           </a:p>
           <a:p>
             <a:pPr lvl="4"/>
             <a:r>
-              <a:rPr kumimoji="1" lang="ja-JP" altLang="en-US" smtClean="0"/>
+              <a:rPr kumimoji="1" lang="ja-JP" altLang="en-US"/>
               <a:t>第 </a:t>
             </a:r>
             <a:r>
-              <a:rPr kumimoji="1" lang="en-US" altLang="ja-JP" smtClean="0"/>
+              <a:rPr kumimoji="1" lang="en-US" altLang="ja-JP"/>
               <a:t>5 </a:t>
             </a:r>
             <a:r>
-              <a:rPr kumimoji="1" lang="ja-JP" altLang="en-US" smtClean="0"/>
+              <a:rPr kumimoji="1" lang="ja-JP" altLang="en-US"/>
               <a:t>レベル</a:t>
             </a:r>
-            <a:endParaRPr kumimoji="1" lang="ja-JP" altLang="en-US"/>
           </a:p>
         </p:txBody>
       </p:sp>
@@ -1121,7 +1123,7 @@
           <a:p>
             <a:fld id="{A7B7A78B-F83C-433A-B1D8-7A578860BA1C}" type="datetimeFigureOut">
               <a:rPr kumimoji="1" lang="ja-JP" altLang="en-US" smtClean="0"/>
-              <a:t>2018/3/27</a:t>
+              <a:t>2018/3/29</a:t>
             </a:fld>
             <a:endParaRPr kumimoji="1" lang="ja-JP" altLang="en-US"/>
           </a:p>
@@ -1215,10 +1217,9 @@
           <a:lstStyle/>
           <a:p>
             <a:r>
-              <a:rPr kumimoji="1" lang="ja-JP" altLang="en-US" smtClean="0"/>
+              <a:rPr kumimoji="1" lang="ja-JP" altLang="en-US"/>
               <a:t>マスター タイトルの書式設定</a:t>
             </a:r>
-            <a:endParaRPr kumimoji="1" lang="ja-JP" altLang="en-US"/>
           </a:p>
         </p:txBody>
       </p:sp>
@@ -1239,70 +1240,69 @@
           <a:p>
             <a:pPr lvl="0"/>
             <a:r>
-              <a:rPr kumimoji="1" lang="ja-JP" altLang="en-US" smtClean="0"/>
+              <a:rPr kumimoji="1" lang="ja-JP" altLang="en-US"/>
               <a:t>マスター テキストの書式設定</a:t>
             </a:r>
           </a:p>
           <a:p>
             <a:pPr lvl="1"/>
             <a:r>
-              <a:rPr kumimoji="1" lang="ja-JP" altLang="en-US" smtClean="0"/>
+              <a:rPr kumimoji="1" lang="ja-JP" altLang="en-US"/>
               <a:t>第 </a:t>
             </a:r>
             <a:r>
-              <a:rPr kumimoji="1" lang="en-US" altLang="ja-JP" smtClean="0"/>
+              <a:rPr kumimoji="1" lang="en-US" altLang="ja-JP"/>
               <a:t>2 </a:t>
             </a:r>
             <a:r>
-              <a:rPr kumimoji="1" lang="ja-JP" altLang="en-US" smtClean="0"/>
+              <a:rPr kumimoji="1" lang="ja-JP" altLang="en-US"/>
               <a:t>レベル</a:t>
             </a:r>
           </a:p>
           <a:p>
             <a:pPr lvl="2"/>
             <a:r>
-              <a:rPr kumimoji="1" lang="ja-JP" altLang="en-US" smtClean="0"/>
+              <a:rPr kumimoji="1" lang="ja-JP" altLang="en-US"/>
               <a:t>第 </a:t>
             </a:r>
             <a:r>
-              <a:rPr kumimoji="1" lang="en-US" altLang="ja-JP" smtClean="0"/>
+              <a:rPr kumimoji="1" lang="en-US" altLang="ja-JP"/>
               <a:t>3 </a:t>
             </a:r>
             <a:r>
-              <a:rPr kumimoji="1" lang="ja-JP" altLang="en-US" smtClean="0"/>
+              <a:rPr kumimoji="1" lang="ja-JP" altLang="en-US"/>
               <a:t>レベル</a:t>
             </a:r>
           </a:p>
           <a:p>
             <a:pPr lvl="3"/>
             <a:r>
-              <a:rPr kumimoji="1" lang="ja-JP" altLang="en-US" smtClean="0"/>
+              <a:rPr kumimoji="1" lang="ja-JP" altLang="en-US"/>
               <a:t>第 </a:t>
             </a:r>
             <a:r>
-              <a:rPr kumimoji="1" lang="en-US" altLang="ja-JP" smtClean="0"/>
+              <a:rPr kumimoji="1" lang="en-US" altLang="ja-JP"/>
               <a:t>4 </a:t>
             </a:r>
             <a:r>
-              <a:rPr kumimoji="1" lang="ja-JP" altLang="en-US" smtClean="0"/>
+              <a:rPr kumimoji="1" lang="ja-JP" altLang="en-US"/>
               <a:t>レベル</a:t>
             </a:r>
           </a:p>
           <a:p>
             <a:pPr lvl="4"/>
             <a:r>
-              <a:rPr kumimoji="1" lang="ja-JP" altLang="en-US" smtClean="0"/>
+              <a:rPr kumimoji="1" lang="ja-JP" altLang="en-US"/>
               <a:t>第 </a:t>
             </a:r>
             <a:r>
-              <a:rPr kumimoji="1" lang="en-US" altLang="ja-JP" smtClean="0"/>
+              <a:rPr kumimoji="1" lang="en-US" altLang="ja-JP"/>
               <a:t>5 </a:t>
             </a:r>
             <a:r>
-              <a:rPr kumimoji="1" lang="ja-JP" altLang="en-US" smtClean="0"/>
+              <a:rPr kumimoji="1" lang="ja-JP" altLang="en-US"/>
               <a:t>レベル</a:t>
             </a:r>
-            <a:endParaRPr kumimoji="1" lang="ja-JP" altLang="en-US"/>
           </a:p>
         </p:txBody>
       </p:sp>
@@ -1323,7 +1323,7 @@
           <a:p>
             <a:fld id="{A7B7A78B-F83C-433A-B1D8-7A578860BA1C}" type="datetimeFigureOut">
               <a:rPr kumimoji="1" lang="ja-JP" altLang="en-US" smtClean="0"/>
-              <a:t>2018/3/27</a:t>
+              <a:t>2018/3/29</a:t>
             </a:fld>
             <a:endParaRPr kumimoji="1" lang="ja-JP" altLang="en-US"/>
           </a:p>
@@ -1426,10 +1426,9 @@
           </a:lstStyle>
           <a:p>
             <a:r>
-              <a:rPr kumimoji="1" lang="ja-JP" altLang="en-US" smtClean="0"/>
+              <a:rPr kumimoji="1" lang="ja-JP" altLang="en-US"/>
               <a:t>マスター タイトルの書式設定</a:t>
             </a:r>
-            <a:endParaRPr kumimoji="1" lang="ja-JP" altLang="en-US"/>
           </a:p>
         </p:txBody>
       </p:sp>
@@ -1546,7 +1545,7 @@
           <a:p>
             <a:pPr lvl="0"/>
             <a:r>
-              <a:rPr kumimoji="1" lang="ja-JP" altLang="en-US" smtClean="0"/>
+              <a:rPr kumimoji="1" lang="ja-JP" altLang="en-US"/>
               <a:t>マスター テキストの書式設定</a:t>
             </a:r>
           </a:p>
@@ -1569,7 +1568,7 @@
           <a:p>
             <a:fld id="{A7B7A78B-F83C-433A-B1D8-7A578860BA1C}" type="datetimeFigureOut">
               <a:rPr kumimoji="1" lang="ja-JP" altLang="en-US" smtClean="0"/>
-              <a:t>2018/3/27</a:t>
+              <a:t>2018/3/29</a:t>
             </a:fld>
             <a:endParaRPr kumimoji="1" lang="ja-JP" altLang="en-US"/>
           </a:p>
@@ -1663,10 +1662,9 @@
           <a:lstStyle/>
           <a:p>
             <a:r>
-              <a:rPr kumimoji="1" lang="ja-JP" altLang="en-US" smtClean="0"/>
+              <a:rPr kumimoji="1" lang="ja-JP" altLang="en-US"/>
               <a:t>マスター タイトルの書式設定</a:t>
             </a:r>
-            <a:endParaRPr kumimoji="1" lang="ja-JP" altLang="en-US"/>
           </a:p>
         </p:txBody>
       </p:sp>
@@ -1692,70 +1690,69 @@
           <a:p>
             <a:pPr lvl="0"/>
             <a:r>
-              <a:rPr kumimoji="1" lang="ja-JP" altLang="en-US" smtClean="0"/>
+              <a:rPr kumimoji="1" lang="ja-JP" altLang="en-US"/>
               <a:t>マスター テキストの書式設定</a:t>
             </a:r>
           </a:p>
           <a:p>
             <a:pPr lvl="1"/>
             <a:r>
-              <a:rPr kumimoji="1" lang="ja-JP" altLang="en-US" smtClean="0"/>
+              <a:rPr kumimoji="1" lang="ja-JP" altLang="en-US"/>
               <a:t>第 </a:t>
             </a:r>
             <a:r>
-              <a:rPr kumimoji="1" lang="en-US" altLang="ja-JP" smtClean="0"/>
+              <a:rPr kumimoji="1" lang="en-US" altLang="ja-JP"/>
               <a:t>2 </a:t>
             </a:r>
             <a:r>
-              <a:rPr kumimoji="1" lang="ja-JP" altLang="en-US" smtClean="0"/>
+              <a:rPr kumimoji="1" lang="ja-JP" altLang="en-US"/>
               <a:t>レベル</a:t>
             </a:r>
           </a:p>
           <a:p>
             <a:pPr lvl="2"/>
             <a:r>
-              <a:rPr kumimoji="1" lang="ja-JP" altLang="en-US" smtClean="0"/>
+              <a:rPr kumimoji="1" lang="ja-JP" altLang="en-US"/>
               <a:t>第 </a:t>
             </a:r>
             <a:r>
-              <a:rPr kumimoji="1" lang="en-US" altLang="ja-JP" smtClean="0"/>
+              <a:rPr kumimoji="1" lang="en-US" altLang="ja-JP"/>
               <a:t>3 </a:t>
             </a:r>
             <a:r>
-              <a:rPr kumimoji="1" lang="ja-JP" altLang="en-US" smtClean="0"/>
+              <a:rPr kumimoji="1" lang="ja-JP" altLang="en-US"/>
               <a:t>レベル</a:t>
             </a:r>
           </a:p>
           <a:p>
             <a:pPr lvl="3"/>
             <a:r>
-              <a:rPr kumimoji="1" lang="ja-JP" altLang="en-US" smtClean="0"/>
+              <a:rPr kumimoji="1" lang="ja-JP" altLang="en-US"/>
               <a:t>第 </a:t>
             </a:r>
             <a:r>
-              <a:rPr kumimoji="1" lang="en-US" altLang="ja-JP" smtClean="0"/>
+              <a:rPr kumimoji="1" lang="en-US" altLang="ja-JP"/>
               <a:t>4 </a:t>
             </a:r>
             <a:r>
-              <a:rPr kumimoji="1" lang="ja-JP" altLang="en-US" smtClean="0"/>
+              <a:rPr kumimoji="1" lang="ja-JP" altLang="en-US"/>
               <a:t>レベル</a:t>
             </a:r>
           </a:p>
           <a:p>
             <a:pPr lvl="4"/>
             <a:r>
-              <a:rPr kumimoji="1" lang="ja-JP" altLang="en-US" smtClean="0"/>
+              <a:rPr kumimoji="1" lang="ja-JP" altLang="en-US"/>
               <a:t>第 </a:t>
             </a:r>
             <a:r>
-              <a:rPr kumimoji="1" lang="en-US" altLang="ja-JP" smtClean="0"/>
+              <a:rPr kumimoji="1" lang="en-US" altLang="ja-JP"/>
               <a:t>5 </a:t>
             </a:r>
             <a:r>
-              <a:rPr kumimoji="1" lang="ja-JP" altLang="en-US" smtClean="0"/>
+              <a:rPr kumimoji="1" lang="ja-JP" altLang="en-US"/>
               <a:t>レベル</a:t>
             </a:r>
-            <a:endParaRPr kumimoji="1" lang="ja-JP" altLang="en-US"/>
           </a:p>
         </p:txBody>
       </p:sp>
@@ -1781,70 +1778,69 @@
           <a:p>
             <a:pPr lvl="0"/>
             <a:r>
-              <a:rPr kumimoji="1" lang="ja-JP" altLang="en-US" smtClean="0"/>
+              <a:rPr kumimoji="1" lang="ja-JP" altLang="en-US"/>
               <a:t>マスター テキストの書式設定</a:t>
             </a:r>
           </a:p>
           <a:p>
             <a:pPr lvl="1"/>
             <a:r>
-              <a:rPr kumimoji="1" lang="ja-JP" altLang="en-US" smtClean="0"/>
+              <a:rPr kumimoji="1" lang="ja-JP" altLang="en-US"/>
               <a:t>第 </a:t>
             </a:r>
             <a:r>
-              <a:rPr kumimoji="1" lang="en-US" altLang="ja-JP" smtClean="0"/>
+              <a:rPr kumimoji="1" lang="en-US" altLang="ja-JP"/>
               <a:t>2 </a:t>
             </a:r>
             <a:r>
-              <a:rPr kumimoji="1" lang="ja-JP" altLang="en-US" smtClean="0"/>
+              <a:rPr kumimoji="1" lang="ja-JP" altLang="en-US"/>
               <a:t>レベル</a:t>
             </a:r>
           </a:p>
           <a:p>
             <a:pPr lvl="2"/>
             <a:r>
-              <a:rPr kumimoji="1" lang="ja-JP" altLang="en-US" smtClean="0"/>
+              <a:rPr kumimoji="1" lang="ja-JP" altLang="en-US"/>
               <a:t>第 </a:t>
             </a:r>
             <a:r>
-              <a:rPr kumimoji="1" lang="en-US" altLang="ja-JP" smtClean="0"/>
+              <a:rPr kumimoji="1" lang="en-US" altLang="ja-JP"/>
               <a:t>3 </a:t>
             </a:r>
             <a:r>
-              <a:rPr kumimoji="1" lang="ja-JP" altLang="en-US" smtClean="0"/>
+              <a:rPr kumimoji="1" lang="ja-JP" altLang="en-US"/>
               <a:t>レベル</a:t>
             </a:r>
           </a:p>
           <a:p>
             <a:pPr lvl="3"/>
             <a:r>
-              <a:rPr kumimoji="1" lang="ja-JP" altLang="en-US" smtClean="0"/>
+              <a:rPr kumimoji="1" lang="ja-JP" altLang="en-US"/>
               <a:t>第 </a:t>
             </a:r>
             <a:r>
-              <a:rPr kumimoji="1" lang="en-US" altLang="ja-JP" smtClean="0"/>
+              <a:rPr kumimoji="1" lang="en-US" altLang="ja-JP"/>
               <a:t>4 </a:t>
             </a:r>
             <a:r>
-              <a:rPr kumimoji="1" lang="ja-JP" altLang="en-US" smtClean="0"/>
+              <a:rPr kumimoji="1" lang="ja-JP" altLang="en-US"/>
               <a:t>レベル</a:t>
             </a:r>
           </a:p>
           <a:p>
             <a:pPr lvl="4"/>
             <a:r>
-              <a:rPr kumimoji="1" lang="ja-JP" altLang="en-US" smtClean="0"/>
+              <a:rPr kumimoji="1" lang="ja-JP" altLang="en-US"/>
               <a:t>第 </a:t>
             </a:r>
             <a:r>
-              <a:rPr kumimoji="1" lang="en-US" altLang="ja-JP" smtClean="0"/>
+              <a:rPr kumimoji="1" lang="en-US" altLang="ja-JP"/>
               <a:t>5 </a:t>
             </a:r>
             <a:r>
-              <a:rPr kumimoji="1" lang="ja-JP" altLang="en-US" smtClean="0"/>
+              <a:rPr kumimoji="1" lang="ja-JP" altLang="en-US"/>
               <a:t>レベル</a:t>
             </a:r>
-            <a:endParaRPr kumimoji="1" lang="ja-JP" altLang="en-US"/>
           </a:p>
         </p:txBody>
       </p:sp>
@@ -1865,7 +1861,7 @@
           <a:p>
             <a:fld id="{A7B7A78B-F83C-433A-B1D8-7A578860BA1C}" type="datetimeFigureOut">
               <a:rPr kumimoji="1" lang="ja-JP" altLang="en-US" smtClean="0"/>
-              <a:t>2018/3/27</a:t>
+              <a:t>2018/3/29</a:t>
             </a:fld>
             <a:endParaRPr kumimoji="1" lang="ja-JP" altLang="en-US"/>
           </a:p>
@@ -1964,10 +1960,9 @@
           <a:lstStyle/>
           <a:p>
             <a:r>
-              <a:rPr kumimoji="1" lang="ja-JP" altLang="en-US" smtClean="0"/>
+              <a:rPr kumimoji="1" lang="ja-JP" altLang="en-US"/>
               <a:t>マスター タイトルの書式設定</a:t>
             </a:r>
-            <a:endParaRPr kumimoji="1" lang="ja-JP" altLang="en-US"/>
           </a:p>
         </p:txBody>
       </p:sp>
@@ -2030,7 +2025,7 @@
           <a:p>
             <a:pPr lvl="0"/>
             <a:r>
-              <a:rPr kumimoji="1" lang="ja-JP" altLang="en-US" smtClean="0"/>
+              <a:rPr kumimoji="1" lang="ja-JP" altLang="en-US"/>
               <a:t>マスター テキストの書式設定</a:t>
             </a:r>
           </a:p>
@@ -2058,70 +2053,69 @@
           <a:p>
             <a:pPr lvl="0"/>
             <a:r>
-              <a:rPr kumimoji="1" lang="ja-JP" altLang="en-US" smtClean="0"/>
+              <a:rPr kumimoji="1" lang="ja-JP" altLang="en-US"/>
               <a:t>マスター テキストの書式設定</a:t>
             </a:r>
           </a:p>
           <a:p>
             <a:pPr lvl="1"/>
             <a:r>
-              <a:rPr kumimoji="1" lang="ja-JP" altLang="en-US" smtClean="0"/>
+              <a:rPr kumimoji="1" lang="ja-JP" altLang="en-US"/>
               <a:t>第 </a:t>
             </a:r>
             <a:r>
-              <a:rPr kumimoji="1" lang="en-US" altLang="ja-JP" smtClean="0"/>
+              <a:rPr kumimoji="1" lang="en-US" altLang="ja-JP"/>
               <a:t>2 </a:t>
             </a:r>
             <a:r>
-              <a:rPr kumimoji="1" lang="ja-JP" altLang="en-US" smtClean="0"/>
+              <a:rPr kumimoji="1" lang="ja-JP" altLang="en-US"/>
               <a:t>レベル</a:t>
             </a:r>
           </a:p>
           <a:p>
             <a:pPr lvl="2"/>
             <a:r>
-              <a:rPr kumimoji="1" lang="ja-JP" altLang="en-US" smtClean="0"/>
+              <a:rPr kumimoji="1" lang="ja-JP" altLang="en-US"/>
               <a:t>第 </a:t>
             </a:r>
             <a:r>
-              <a:rPr kumimoji="1" lang="en-US" altLang="ja-JP" smtClean="0"/>
+              <a:rPr kumimoji="1" lang="en-US" altLang="ja-JP"/>
               <a:t>3 </a:t>
             </a:r>
             <a:r>
-              <a:rPr kumimoji="1" lang="ja-JP" altLang="en-US" smtClean="0"/>
+              <a:rPr kumimoji="1" lang="ja-JP" altLang="en-US"/>
               <a:t>レベル</a:t>
             </a:r>
           </a:p>
           <a:p>
             <a:pPr lvl="3"/>
             <a:r>
-              <a:rPr kumimoji="1" lang="ja-JP" altLang="en-US" smtClean="0"/>
+              <a:rPr kumimoji="1" lang="ja-JP" altLang="en-US"/>
               <a:t>第 </a:t>
             </a:r>
             <a:r>
-              <a:rPr kumimoji="1" lang="en-US" altLang="ja-JP" smtClean="0"/>
+              <a:rPr kumimoji="1" lang="en-US" altLang="ja-JP"/>
               <a:t>4 </a:t>
             </a:r>
             <a:r>
-              <a:rPr kumimoji="1" lang="ja-JP" altLang="en-US" smtClean="0"/>
+              <a:rPr kumimoji="1" lang="ja-JP" altLang="en-US"/>
               <a:t>レベル</a:t>
             </a:r>
           </a:p>
           <a:p>
             <a:pPr lvl="4"/>
             <a:r>
-              <a:rPr kumimoji="1" lang="ja-JP" altLang="en-US" smtClean="0"/>
+              <a:rPr kumimoji="1" lang="ja-JP" altLang="en-US"/>
               <a:t>第 </a:t>
             </a:r>
             <a:r>
-              <a:rPr kumimoji="1" lang="en-US" altLang="ja-JP" smtClean="0"/>
+              <a:rPr kumimoji="1" lang="en-US" altLang="ja-JP"/>
               <a:t>5 </a:t>
             </a:r>
             <a:r>
-              <a:rPr kumimoji="1" lang="ja-JP" altLang="en-US" smtClean="0"/>
+              <a:rPr kumimoji="1" lang="ja-JP" altLang="en-US"/>
               <a:t>レベル</a:t>
             </a:r>
-            <a:endParaRPr kumimoji="1" lang="ja-JP" altLang="en-US"/>
           </a:p>
         </p:txBody>
       </p:sp>
@@ -2184,7 +2178,7 @@
           <a:p>
             <a:pPr lvl="0"/>
             <a:r>
-              <a:rPr kumimoji="1" lang="ja-JP" altLang="en-US" smtClean="0"/>
+              <a:rPr kumimoji="1" lang="ja-JP" altLang="en-US"/>
               <a:t>マスター テキストの書式設定</a:t>
             </a:r>
           </a:p>
@@ -2212,70 +2206,69 @@
           <a:p>
             <a:pPr lvl="0"/>
             <a:r>
-              <a:rPr kumimoji="1" lang="ja-JP" altLang="en-US" smtClean="0"/>
+              <a:rPr kumimoji="1" lang="ja-JP" altLang="en-US"/>
               <a:t>マスター テキストの書式設定</a:t>
             </a:r>
           </a:p>
           <a:p>
             <a:pPr lvl="1"/>
             <a:r>
-              <a:rPr kumimoji="1" lang="ja-JP" altLang="en-US" smtClean="0"/>
+              <a:rPr kumimoji="1" lang="ja-JP" altLang="en-US"/>
               <a:t>第 </a:t>
             </a:r>
             <a:r>
-              <a:rPr kumimoji="1" lang="en-US" altLang="ja-JP" smtClean="0"/>
+              <a:rPr kumimoji="1" lang="en-US" altLang="ja-JP"/>
               <a:t>2 </a:t>
             </a:r>
             <a:r>
-              <a:rPr kumimoji="1" lang="ja-JP" altLang="en-US" smtClean="0"/>
+              <a:rPr kumimoji="1" lang="ja-JP" altLang="en-US"/>
               <a:t>レベル</a:t>
             </a:r>
           </a:p>
           <a:p>
             <a:pPr lvl="2"/>
             <a:r>
-              <a:rPr kumimoji="1" lang="ja-JP" altLang="en-US" smtClean="0"/>
+              <a:rPr kumimoji="1" lang="ja-JP" altLang="en-US"/>
               <a:t>第 </a:t>
             </a:r>
             <a:r>
-              <a:rPr kumimoji="1" lang="en-US" altLang="ja-JP" smtClean="0"/>
+              <a:rPr kumimoji="1" lang="en-US" altLang="ja-JP"/>
               <a:t>3 </a:t>
             </a:r>
             <a:r>
-              <a:rPr kumimoji="1" lang="ja-JP" altLang="en-US" smtClean="0"/>
+              <a:rPr kumimoji="1" lang="ja-JP" altLang="en-US"/>
               <a:t>レベル</a:t>
             </a:r>
           </a:p>
           <a:p>
             <a:pPr lvl="3"/>
             <a:r>
-              <a:rPr kumimoji="1" lang="ja-JP" altLang="en-US" smtClean="0"/>
+              <a:rPr kumimoji="1" lang="ja-JP" altLang="en-US"/>
               <a:t>第 </a:t>
             </a:r>
             <a:r>
-              <a:rPr kumimoji="1" lang="en-US" altLang="ja-JP" smtClean="0"/>
+              <a:rPr kumimoji="1" lang="en-US" altLang="ja-JP"/>
               <a:t>4 </a:t>
             </a:r>
             <a:r>
-              <a:rPr kumimoji="1" lang="ja-JP" altLang="en-US" smtClean="0"/>
+              <a:rPr kumimoji="1" lang="ja-JP" altLang="en-US"/>
               <a:t>レベル</a:t>
             </a:r>
           </a:p>
           <a:p>
             <a:pPr lvl="4"/>
             <a:r>
-              <a:rPr kumimoji="1" lang="ja-JP" altLang="en-US" smtClean="0"/>
+              <a:rPr kumimoji="1" lang="ja-JP" altLang="en-US"/>
               <a:t>第 </a:t>
             </a:r>
             <a:r>
-              <a:rPr kumimoji="1" lang="en-US" altLang="ja-JP" smtClean="0"/>
+              <a:rPr kumimoji="1" lang="en-US" altLang="ja-JP"/>
               <a:t>5 </a:t>
             </a:r>
             <a:r>
-              <a:rPr kumimoji="1" lang="ja-JP" altLang="en-US" smtClean="0"/>
+              <a:rPr kumimoji="1" lang="ja-JP" altLang="en-US"/>
               <a:t>レベル</a:t>
             </a:r>
-            <a:endParaRPr kumimoji="1" lang="ja-JP" altLang="en-US"/>
           </a:p>
         </p:txBody>
       </p:sp>
@@ -2296,7 +2289,7 @@
           <a:p>
             <a:fld id="{A7B7A78B-F83C-433A-B1D8-7A578860BA1C}" type="datetimeFigureOut">
               <a:rPr kumimoji="1" lang="ja-JP" altLang="en-US" smtClean="0"/>
-              <a:t>2018/3/27</a:t>
+              <a:t>2018/3/29</a:t>
             </a:fld>
             <a:endParaRPr kumimoji="1" lang="ja-JP" altLang="en-US"/>
           </a:p>
@@ -2390,10 +2383,9 @@
           <a:lstStyle/>
           <a:p>
             <a:r>
-              <a:rPr kumimoji="1" lang="ja-JP" altLang="en-US" smtClean="0"/>
+              <a:rPr kumimoji="1" lang="ja-JP" altLang="en-US"/>
               <a:t>マスター タイトルの書式設定</a:t>
             </a:r>
-            <a:endParaRPr kumimoji="1" lang="ja-JP" altLang="en-US"/>
           </a:p>
         </p:txBody>
       </p:sp>
@@ -2414,7 +2406,7 @@
           <a:p>
             <a:fld id="{A7B7A78B-F83C-433A-B1D8-7A578860BA1C}" type="datetimeFigureOut">
               <a:rPr kumimoji="1" lang="ja-JP" altLang="en-US" smtClean="0"/>
-              <a:t>2018/3/27</a:t>
+              <a:t>2018/3/29</a:t>
             </a:fld>
             <a:endParaRPr kumimoji="1" lang="ja-JP" altLang="en-US"/>
           </a:p>
@@ -2509,7 +2501,7 @@
           <a:p>
             <a:fld id="{A7B7A78B-F83C-433A-B1D8-7A578860BA1C}" type="datetimeFigureOut">
               <a:rPr kumimoji="1" lang="ja-JP" altLang="en-US" smtClean="0"/>
-              <a:t>2018/3/27</a:t>
+              <a:t>2018/3/29</a:t>
             </a:fld>
             <a:endParaRPr kumimoji="1" lang="ja-JP" altLang="en-US"/>
           </a:p>
@@ -2612,10 +2604,9 @@
           </a:lstStyle>
           <a:p>
             <a:r>
-              <a:rPr kumimoji="1" lang="ja-JP" altLang="en-US" smtClean="0"/>
+              <a:rPr kumimoji="1" lang="ja-JP" altLang="en-US"/>
               <a:t>マスター タイトルの書式設定</a:t>
             </a:r>
-            <a:endParaRPr kumimoji="1" lang="ja-JP" altLang="en-US"/>
           </a:p>
         </p:txBody>
       </p:sp>
@@ -2669,70 +2660,69 @@
           <a:p>
             <a:pPr lvl="0"/>
             <a:r>
-              <a:rPr kumimoji="1" lang="ja-JP" altLang="en-US" smtClean="0"/>
+              <a:rPr kumimoji="1" lang="ja-JP" altLang="en-US"/>
               <a:t>マスター テキストの書式設定</a:t>
             </a:r>
           </a:p>
           <a:p>
             <a:pPr lvl="1"/>
             <a:r>
-              <a:rPr kumimoji="1" lang="ja-JP" altLang="en-US" smtClean="0"/>
+              <a:rPr kumimoji="1" lang="ja-JP" altLang="en-US"/>
               <a:t>第 </a:t>
             </a:r>
             <a:r>
-              <a:rPr kumimoji="1" lang="en-US" altLang="ja-JP" smtClean="0"/>
+              <a:rPr kumimoji="1" lang="en-US" altLang="ja-JP"/>
               <a:t>2 </a:t>
             </a:r>
             <a:r>
-              <a:rPr kumimoji="1" lang="ja-JP" altLang="en-US" smtClean="0"/>
+              <a:rPr kumimoji="1" lang="ja-JP" altLang="en-US"/>
               <a:t>レベル</a:t>
             </a:r>
           </a:p>
           <a:p>
             <a:pPr lvl="2"/>
             <a:r>
-              <a:rPr kumimoji="1" lang="ja-JP" altLang="en-US" smtClean="0"/>
+              <a:rPr kumimoji="1" lang="ja-JP" altLang="en-US"/>
               <a:t>第 </a:t>
             </a:r>
             <a:r>
-              <a:rPr kumimoji="1" lang="en-US" altLang="ja-JP" smtClean="0"/>
+              <a:rPr kumimoji="1" lang="en-US" altLang="ja-JP"/>
               <a:t>3 </a:t>
             </a:r>
             <a:r>
-              <a:rPr kumimoji="1" lang="ja-JP" altLang="en-US" smtClean="0"/>
+              <a:rPr kumimoji="1" lang="ja-JP" altLang="en-US"/>
               <a:t>レベル</a:t>
             </a:r>
           </a:p>
           <a:p>
             <a:pPr lvl="3"/>
             <a:r>
-              <a:rPr kumimoji="1" lang="ja-JP" altLang="en-US" smtClean="0"/>
+              <a:rPr kumimoji="1" lang="ja-JP" altLang="en-US"/>
               <a:t>第 </a:t>
             </a:r>
             <a:r>
-              <a:rPr kumimoji="1" lang="en-US" altLang="ja-JP" smtClean="0"/>
+              <a:rPr kumimoji="1" lang="en-US" altLang="ja-JP"/>
               <a:t>4 </a:t>
             </a:r>
             <a:r>
-              <a:rPr kumimoji="1" lang="ja-JP" altLang="en-US" smtClean="0"/>
+              <a:rPr kumimoji="1" lang="ja-JP" altLang="en-US"/>
               <a:t>レベル</a:t>
             </a:r>
           </a:p>
           <a:p>
             <a:pPr lvl="4"/>
             <a:r>
-              <a:rPr kumimoji="1" lang="ja-JP" altLang="en-US" smtClean="0"/>
+              <a:rPr kumimoji="1" lang="ja-JP" altLang="en-US"/>
               <a:t>第 </a:t>
             </a:r>
             <a:r>
-              <a:rPr kumimoji="1" lang="en-US" altLang="ja-JP" smtClean="0"/>
+              <a:rPr kumimoji="1" lang="en-US" altLang="ja-JP"/>
               <a:t>5 </a:t>
             </a:r>
             <a:r>
-              <a:rPr kumimoji="1" lang="ja-JP" altLang="en-US" smtClean="0"/>
+              <a:rPr kumimoji="1" lang="ja-JP" altLang="en-US"/>
               <a:t>レベル</a:t>
             </a:r>
-            <a:endParaRPr kumimoji="1" lang="ja-JP" altLang="en-US"/>
           </a:p>
         </p:txBody>
       </p:sp>
@@ -2795,7 +2785,7 @@
           <a:p>
             <a:pPr lvl="0"/>
             <a:r>
-              <a:rPr kumimoji="1" lang="ja-JP" altLang="en-US" smtClean="0"/>
+              <a:rPr kumimoji="1" lang="ja-JP" altLang="en-US"/>
               <a:t>マスター テキストの書式設定</a:t>
             </a:r>
           </a:p>
@@ -2818,7 +2808,7 @@
           <a:p>
             <a:fld id="{A7B7A78B-F83C-433A-B1D8-7A578860BA1C}" type="datetimeFigureOut">
               <a:rPr kumimoji="1" lang="ja-JP" altLang="en-US" smtClean="0"/>
-              <a:t>2018/3/27</a:t>
+              <a:t>2018/3/29</a:t>
             </a:fld>
             <a:endParaRPr kumimoji="1" lang="ja-JP" altLang="en-US"/>
           </a:p>
@@ -2921,10 +2911,9 @@
           </a:lstStyle>
           <a:p>
             <a:r>
-              <a:rPr kumimoji="1" lang="ja-JP" altLang="en-US" smtClean="0"/>
+              <a:rPr kumimoji="1" lang="ja-JP" altLang="en-US"/>
               <a:t>マスター タイトルの書式設定</a:t>
             </a:r>
-            <a:endParaRPr kumimoji="1" lang="ja-JP" altLang="en-US"/>
           </a:p>
         </p:txBody>
       </p:sp>
@@ -3048,7 +3037,7 @@
           <a:p>
             <a:pPr lvl="0"/>
             <a:r>
-              <a:rPr kumimoji="1" lang="ja-JP" altLang="en-US" smtClean="0"/>
+              <a:rPr kumimoji="1" lang="ja-JP" altLang="en-US"/>
               <a:t>マスター テキストの書式設定</a:t>
             </a:r>
           </a:p>
@@ -3071,7 +3060,7 @@
           <a:p>
             <a:fld id="{A7B7A78B-F83C-433A-B1D8-7A578860BA1C}" type="datetimeFigureOut">
               <a:rPr kumimoji="1" lang="ja-JP" altLang="en-US" smtClean="0"/>
-              <a:t>2018/3/27</a:t>
+              <a:t>2018/3/29</a:t>
             </a:fld>
             <a:endParaRPr kumimoji="1" lang="ja-JP" altLang="en-US"/>
           </a:p>
@@ -3180,10 +3169,9 @@
           <a:lstStyle/>
           <a:p>
             <a:r>
-              <a:rPr kumimoji="1" lang="ja-JP" altLang="en-US" smtClean="0"/>
+              <a:rPr kumimoji="1" lang="ja-JP" altLang="en-US"/>
               <a:t>マスター タイトルの書式設定</a:t>
             </a:r>
-            <a:endParaRPr kumimoji="1" lang="ja-JP" altLang="en-US"/>
           </a:p>
         </p:txBody>
       </p:sp>
@@ -3214,70 +3202,69 @@
           <a:p>
             <a:pPr lvl="0"/>
             <a:r>
-              <a:rPr kumimoji="1" lang="ja-JP" altLang="en-US" smtClean="0"/>
+              <a:rPr kumimoji="1" lang="ja-JP" altLang="en-US"/>
               <a:t>マスター テキストの書式設定</a:t>
             </a:r>
           </a:p>
           <a:p>
             <a:pPr lvl="1"/>
             <a:r>
-              <a:rPr kumimoji="1" lang="ja-JP" altLang="en-US" smtClean="0"/>
+              <a:rPr kumimoji="1" lang="ja-JP" altLang="en-US"/>
               <a:t>第 </a:t>
             </a:r>
             <a:r>
-              <a:rPr kumimoji="1" lang="en-US" altLang="ja-JP" smtClean="0"/>
+              <a:rPr kumimoji="1" lang="en-US" altLang="ja-JP"/>
               <a:t>2 </a:t>
             </a:r>
             <a:r>
-              <a:rPr kumimoji="1" lang="ja-JP" altLang="en-US" smtClean="0"/>
+              <a:rPr kumimoji="1" lang="ja-JP" altLang="en-US"/>
               <a:t>レベル</a:t>
             </a:r>
           </a:p>
           <a:p>
             <a:pPr lvl="2"/>
             <a:r>
-              <a:rPr kumimoji="1" lang="ja-JP" altLang="en-US" smtClean="0"/>
+              <a:rPr kumimoji="1" lang="ja-JP" altLang="en-US"/>
               <a:t>第 </a:t>
             </a:r>
             <a:r>
-              <a:rPr kumimoji="1" lang="en-US" altLang="ja-JP" smtClean="0"/>
+              <a:rPr kumimoji="1" lang="en-US" altLang="ja-JP"/>
               <a:t>3 </a:t>
             </a:r>
             <a:r>
-              <a:rPr kumimoji="1" lang="ja-JP" altLang="en-US" smtClean="0"/>
+              <a:rPr kumimoji="1" lang="ja-JP" altLang="en-US"/>
               <a:t>レベル</a:t>
             </a:r>
           </a:p>
           <a:p>
             <a:pPr lvl="3"/>
             <a:r>
-              <a:rPr kumimoji="1" lang="ja-JP" altLang="en-US" smtClean="0"/>
+              <a:rPr kumimoji="1" lang="ja-JP" altLang="en-US"/>
               <a:t>第 </a:t>
             </a:r>
             <a:r>
-              <a:rPr kumimoji="1" lang="en-US" altLang="ja-JP" smtClean="0"/>
+              <a:rPr kumimoji="1" lang="en-US" altLang="ja-JP"/>
               <a:t>4 </a:t>
             </a:r>
             <a:r>
-              <a:rPr kumimoji="1" lang="ja-JP" altLang="en-US" smtClean="0"/>
+              <a:rPr kumimoji="1" lang="ja-JP" altLang="en-US"/>
               <a:t>レベル</a:t>
             </a:r>
           </a:p>
           <a:p>
             <a:pPr lvl="4"/>
             <a:r>
-              <a:rPr kumimoji="1" lang="ja-JP" altLang="en-US" smtClean="0"/>
+              <a:rPr kumimoji="1" lang="ja-JP" altLang="en-US"/>
               <a:t>第 </a:t>
             </a:r>
             <a:r>
-              <a:rPr kumimoji="1" lang="en-US" altLang="ja-JP" smtClean="0"/>
+              <a:rPr kumimoji="1" lang="en-US" altLang="ja-JP"/>
               <a:t>5 </a:t>
             </a:r>
             <a:r>
-              <a:rPr kumimoji="1" lang="ja-JP" altLang="en-US" smtClean="0"/>
+              <a:rPr kumimoji="1" lang="ja-JP" altLang="en-US"/>
               <a:t>レベル</a:t>
             </a:r>
-            <a:endParaRPr kumimoji="1" lang="ja-JP" altLang="en-US"/>
           </a:p>
         </p:txBody>
       </p:sp>
@@ -3316,7 +3303,7 @@
           <a:p>
             <a:fld id="{A7B7A78B-F83C-433A-B1D8-7A578860BA1C}" type="datetimeFigureOut">
               <a:rPr kumimoji="1" lang="ja-JP" altLang="en-US" smtClean="0"/>
-              <a:t>2018/3/27</a:t>
+              <a:t>2018/3/29</a:t>
             </a:fld>
             <a:endParaRPr kumimoji="1" lang="ja-JP" altLang="en-US"/>
           </a:p>
@@ -3801,7 +3788,7 @@
           <a:p>
             <a:pPr algn="ctr"/>
             <a:r>
-              <a:rPr kumimoji="1" lang="en-US" altLang="ja-JP" sz="3600" b="1" dirty="0" err="1" smtClean="0"/>
+              <a:rPr kumimoji="1" lang="en-US" altLang="ja-JP" sz="3600" b="1" dirty="0" err="1"/>
               <a:t>cbid</a:t>
             </a:r>
             <a:endParaRPr kumimoji="1" lang="ja-JP" altLang="en-US" sz="3600" b="1" dirty="0"/>
@@ -3843,15 +3830,15 @@
           <a:p>
             <a:pPr algn="ctr"/>
             <a:r>
-              <a:rPr kumimoji="1" lang="en-US" altLang="ja-JP" sz="3600" dirty="0" smtClean="0"/>
+              <a:rPr kumimoji="1" lang="en-US" altLang="ja-JP" sz="3600" dirty="0"/>
               <a:t>Docker</a:t>
             </a:r>
             <a:br>
-              <a:rPr kumimoji="1" lang="en-US" altLang="ja-JP" sz="3600" dirty="0" smtClean="0"/>
+              <a:rPr kumimoji="1" lang="en-US" altLang="ja-JP" sz="3600" dirty="0"/>
             </a:br>
             <a:r>
-              <a:rPr kumimoji="1" lang="en-US" altLang="ja-JP" sz="1600" dirty="0" smtClean="0"/>
-              <a:t>driver</a:t>
+              <a:rPr lang="en-US" altLang="ja-JP" sz="1600" dirty="0"/>
+              <a:t>plugin</a:t>
             </a:r>
             <a:endParaRPr kumimoji="1" lang="ja-JP" altLang="en-US" sz="3600" dirty="0"/>
           </a:p>
@@ -3892,19 +3879,15 @@
           <a:p>
             <a:pPr algn="ctr"/>
             <a:r>
-              <a:rPr lang="en-US" altLang="ja-JP" sz="3600" dirty="0" err="1" smtClean="0"/>
+              <a:rPr lang="en-US" altLang="ja-JP" sz="3600" dirty="0" err="1"/>
               <a:t>img</a:t>
-            </a:r>
-            <a:r>
-              <a:rPr lang="en-US" altLang="ja-JP" sz="3600" dirty="0"/>
-              <a:t/>
             </a:r>
             <a:br>
               <a:rPr lang="en-US" altLang="ja-JP" sz="3600" dirty="0"/>
             </a:br>
             <a:r>
               <a:rPr lang="en-US" altLang="ja-JP" sz="1600" dirty="0"/>
-              <a:t>driver</a:t>
+              <a:t>plugin</a:t>
             </a:r>
             <a:endParaRPr lang="ja-JP" altLang="en-US" sz="3600" dirty="0"/>
           </a:p>
@@ -3945,19 +3928,15 @@
           <a:p>
             <a:pPr algn="ctr"/>
             <a:r>
-              <a:rPr lang="en-US" altLang="ja-JP" sz="3600" dirty="0" err="1" smtClean="0"/>
+              <a:rPr lang="en-US" altLang="ja-JP" sz="3600" dirty="0" err="1"/>
               <a:t>BuildKit</a:t>
-            </a:r>
-            <a:r>
-              <a:rPr lang="en-US" altLang="ja-JP" sz="3600" dirty="0"/>
-              <a:t/>
             </a:r>
             <a:br>
               <a:rPr lang="en-US" altLang="ja-JP" sz="3600" dirty="0"/>
             </a:br>
             <a:r>
               <a:rPr lang="en-US" altLang="ja-JP" sz="1600" dirty="0"/>
-              <a:t>driver</a:t>
+              <a:t>plugin</a:t>
             </a:r>
             <a:endParaRPr lang="ja-JP" altLang="en-US" sz="3600" dirty="0"/>
           </a:p>
@@ -3998,19 +3977,15 @@
           <a:p>
             <a:pPr algn="ctr"/>
             <a:r>
-              <a:rPr lang="en-US" altLang="ja-JP" sz="3600" dirty="0" err="1" smtClean="0"/>
+              <a:rPr lang="en-US" altLang="ja-JP" sz="3600" dirty="0" err="1"/>
               <a:t>Buildah</a:t>
-            </a:r>
-            <a:r>
-              <a:rPr lang="en-US" altLang="ja-JP" sz="3600" dirty="0"/>
-              <a:t/>
             </a:r>
             <a:br>
               <a:rPr lang="en-US" altLang="ja-JP" sz="3600" dirty="0"/>
             </a:br>
             <a:r>
               <a:rPr lang="en-US" altLang="ja-JP" sz="1600" dirty="0"/>
-              <a:t>driver</a:t>
+              <a:t>plugin</a:t>
             </a:r>
             <a:endParaRPr lang="ja-JP" altLang="en-US" sz="3600" dirty="0"/>
           </a:p>
@@ -4051,19 +4026,15 @@
           <a:p>
             <a:pPr algn="ctr"/>
             <a:r>
-              <a:rPr lang="en-US" altLang="ja-JP" sz="3600" dirty="0" smtClean="0"/>
+              <a:rPr lang="en-US" altLang="ja-JP" sz="3600" dirty="0"/>
               <a:t>GCB</a:t>
-            </a:r>
-            <a:r>
-              <a:rPr lang="en-US" altLang="ja-JP" sz="3600" dirty="0"/>
-              <a:t/>
             </a:r>
             <a:br>
               <a:rPr lang="en-US" altLang="ja-JP" sz="3600" dirty="0"/>
             </a:br>
             <a:r>
               <a:rPr lang="en-US" altLang="ja-JP" sz="1600" dirty="0"/>
-              <a:t>driver</a:t>
+              <a:t>plugin</a:t>
             </a:r>
             <a:endParaRPr lang="ja-JP" altLang="en-US" sz="3600" dirty="0"/>
           </a:p>
@@ -4104,7 +4075,7 @@
           <a:p>
             <a:pPr algn="ctr"/>
             <a:r>
-              <a:rPr kumimoji="1" lang="en-US" altLang="ja-JP" sz="3200" dirty="0" err="1" smtClean="0"/>
+              <a:rPr kumimoji="1" lang="en-US" altLang="ja-JP" sz="3200" dirty="0" err="1"/>
               <a:t>kubectl</a:t>
             </a:r>
             <a:endParaRPr kumimoji="1" lang="ja-JP" altLang="en-US" sz="3200" dirty="0"/>
@@ -4146,7 +4117,7 @@
           <a:p>
             <a:pPr algn="ctr"/>
             <a:r>
-              <a:rPr kumimoji="1" lang="en-US" altLang="ja-JP" sz="3600" b="1" dirty="0" err="1" smtClean="0"/>
+              <a:rPr kumimoji="1" lang="en-US" altLang="ja-JP" sz="3600" b="1" dirty="0" err="1"/>
               <a:t>cbism</a:t>
             </a:r>
             <a:endParaRPr kumimoji="1" lang="ja-JP" altLang="en-US" sz="3600" b="1" dirty="0"/>
@@ -4282,7 +4253,7 @@
           <a:p>
             <a:pPr algn="ctr"/>
             <a:r>
-              <a:rPr lang="en-US" altLang="ja-JP" sz="3200" b="1" dirty="0" err="1" smtClean="0"/>
+              <a:rPr lang="en-US" altLang="ja-JP" sz="3200" b="1" dirty="0" err="1"/>
               <a:t>cbictl</a:t>
             </a:r>
             <a:endParaRPr kumimoji="1" lang="ja-JP" altLang="en-US" sz="3200" b="1" dirty="0"/>
@@ -4360,7 +4331,7 @@
           <a:p>
             <a:pPr algn="ctr"/>
             <a:r>
-              <a:rPr kumimoji="1" lang="en-US" altLang="ja-JP" sz="3600" dirty="0" smtClean="0"/>
+              <a:rPr kumimoji="1" lang="en-US" altLang="ja-JP" sz="3600" dirty="0"/>
               <a:t>Registry</a:t>
             </a:r>
             <a:endParaRPr kumimoji="1" lang="ja-JP" altLang="en-US" sz="3600" dirty="0"/>
@@ -5101,15 +5072,15 @@
           <a:lstStyle/>
           <a:p>
             <a:r>
-              <a:rPr kumimoji="1" lang="en-US" altLang="ja-JP" sz="2000" dirty="0" smtClean="0"/>
+              <a:rPr kumimoji="1" lang="en-US" altLang="ja-JP" sz="2000" dirty="0"/>
               <a:t>CBI CRD ("</a:t>
             </a:r>
             <a:r>
-              <a:rPr kumimoji="1" lang="en-US" altLang="ja-JP" sz="2000" dirty="0" err="1" smtClean="0"/>
+              <a:rPr kumimoji="1" lang="en-US" altLang="ja-JP" sz="2000" dirty="0" err="1"/>
               <a:t>buildjob</a:t>
             </a:r>
             <a:r>
-              <a:rPr kumimoji="1" lang="en-US" altLang="ja-JP" sz="2000" dirty="0" smtClean="0"/>
+              <a:rPr kumimoji="1" lang="en-US" altLang="ja-JP" sz="2000" dirty="0"/>
               <a:t>")</a:t>
             </a:r>
             <a:endParaRPr kumimoji="1" lang="ja-JP" altLang="en-US" sz="2000" dirty="0"/>
@@ -5139,34 +5110,34 @@
           <a:lstStyle/>
           <a:p>
             <a:r>
-              <a:rPr kumimoji="1" lang="en-US" altLang="ja-JP" sz="1400" dirty="0" smtClean="0"/>
+              <a:rPr kumimoji="1" lang="en-US" altLang="ja-JP" sz="1400" dirty="0"/>
               <a:t>[Optional] </a:t>
             </a:r>
             <a:r>
-              <a:rPr kumimoji="1" lang="en-US" altLang="ja-JP" sz="1400" dirty="0" err="1" smtClean="0"/>
+              <a:rPr kumimoji="1" lang="en-US" altLang="ja-JP" sz="1400" dirty="0" err="1"/>
               <a:t>BuildKit</a:t>
             </a:r>
             <a:r>
-              <a:rPr kumimoji="1" lang="en-US" altLang="ja-JP" sz="1400" dirty="0" smtClean="0"/>
+              <a:rPr kumimoji="1" lang="en-US" altLang="ja-JP" sz="1400" dirty="0"/>
               <a:t> session </a:t>
             </a:r>
             <a:r>
-              <a:rPr kumimoji="1" lang="en-US" altLang="ja-JP" sz="1400" dirty="0" err="1" smtClean="0"/>
+              <a:rPr kumimoji="1" lang="en-US" altLang="ja-JP" sz="1400" dirty="0" err="1"/>
               <a:t>gRPC</a:t>
             </a:r>
-            <a:endParaRPr kumimoji="1" lang="en-US" altLang="ja-JP" sz="1400" dirty="0" smtClean="0"/>
-          </a:p>
-          <a:p>
-            <a:r>
-              <a:rPr lang="en-US" altLang="ja-JP" sz="1400" dirty="0" smtClean="0"/>
+            <a:endParaRPr kumimoji="1" lang="en-US" altLang="ja-JP" sz="1400" dirty="0"/>
+          </a:p>
+          <a:p>
+            <a:r>
+              <a:rPr lang="en-US" altLang="ja-JP" sz="1400" dirty="0"/>
               <a:t>(for sending large context with </a:t>
             </a:r>
             <a:r>
-              <a:rPr lang="en-US" altLang="ja-JP" sz="1400" dirty="0" err="1" smtClean="0"/>
+              <a:rPr lang="en-US" altLang="ja-JP" sz="1400" dirty="0" err="1"/>
               <a:t>diffcopy</a:t>
             </a:r>
             <a:r>
-              <a:rPr lang="en-US" altLang="ja-JP" sz="1400" dirty="0" smtClean="0"/>
+              <a:rPr lang="en-US" altLang="ja-JP" sz="1400" dirty="0"/>
               <a:t>)</a:t>
             </a:r>
             <a:endParaRPr kumimoji="1" lang="ja-JP" altLang="en-US" sz="1400" dirty="0"/>
@@ -5182,7 +5153,7 @@
         <p:spPr>
           <a:xfrm>
             <a:off x="5890016" y="2120210"/>
-            <a:ext cx="1859548" cy="400110"/>
+            <a:ext cx="1628972" cy="400110"/>
           </a:xfrm>
           <a:prstGeom prst="rect">
             <a:avLst/>
@@ -5196,14 +5167,34 @@
           <a:lstStyle/>
           <a:p>
             <a:r>
-              <a:rPr kumimoji="1" lang="en-US" altLang="ja-JP" sz="2000" dirty="0" smtClean="0">
+              <a:rPr kumimoji="1" lang="en-US" altLang="ja-JP" sz="2000" dirty="0">
                 <a:solidFill>
                   <a:schemeClr val="accent6">
                     <a:lumMod val="75000"/>
                   </a:schemeClr>
                 </a:solidFill>
               </a:rPr>
-              <a:t>CBI backend API</a:t>
+              <a:t>CBI </a:t>
+            </a:r>
+            <a:r>
+              <a:rPr lang="en-US" altLang="ja-JP" sz="2000" dirty="0">
+                <a:solidFill>
+                  <a:schemeClr val="accent6">
+                    <a:lumMod val="75000"/>
+                  </a:schemeClr>
+                </a:solidFill>
+              </a:rPr>
+              <a:t>plugin</a:t>
+            </a:r>
+            <a:r>
+              <a:rPr kumimoji="1" lang="en-US" altLang="ja-JP" sz="2000" dirty="0">
+                <a:solidFill>
+                  <a:schemeClr val="accent6">
+                    <a:lumMod val="75000"/>
+                  </a:schemeClr>
+                </a:solidFill>
+              </a:rPr>
+              <a:t> API</a:t>
             </a:r>
             <a:endParaRPr kumimoji="1" lang="ja-JP" altLang="en-US" sz="2000" dirty="0">
               <a:solidFill>
@@ -5238,7 +5229,7 @@
           <a:lstStyle/>
           <a:p>
             <a:r>
-              <a:rPr kumimoji="1" lang="en-US" altLang="ja-JP" sz="2000" dirty="0" smtClean="0">
+              <a:rPr kumimoji="1" lang="en-US" altLang="ja-JP" sz="2000" dirty="0">
                 <a:solidFill>
                   <a:srgbClr val="7030A0"/>
                 </a:solidFill>
@@ -5246,14 +5237,14 @@
               <a:t>OCI Distribution Spec</a:t>
             </a:r>
             <a:br>
-              <a:rPr kumimoji="1" lang="en-US" altLang="ja-JP" sz="2000" dirty="0" smtClean="0">
+              <a:rPr kumimoji="1" lang="en-US" altLang="ja-JP" sz="2000" dirty="0">
                 <a:solidFill>
                   <a:srgbClr val="7030A0"/>
                 </a:solidFill>
               </a:rPr>
             </a:br>
             <a:r>
-              <a:rPr kumimoji="1" lang="en-US" altLang="ja-JP" sz="2000" dirty="0" smtClean="0">
+              <a:rPr kumimoji="1" lang="en-US" altLang="ja-JP" sz="2000" dirty="0">
                 <a:solidFill>
                   <a:srgbClr val="7030A0"/>
                 </a:solidFill>

</xml_diff>